<commit_message>
Beta 0.900000009 der folien von CodeCarnifex
</commit_message>
<xml_diff>
--- a/Final_Report/InFinalReportEinpflegen (Fuer Jan)/presentation_sample/ToC_Introduction_Customer_Needs_State_Bumblebee.pptx
+++ b/Final_Report/InFinalReportEinpflegen (Fuer Jan)/presentation_sample/ToC_Introduction_Customer_Needs_State_Bumblebee.pptx
@@ -5,13 +5,14 @@
     <p:sldMasterId id="2147483750" r:id="rId1"/>
   </p:sldMasterIdLst>
   <p:notesMasterIdLst>
-    <p:notesMasterId r:id="rId6"/>
+    <p:notesMasterId r:id="rId7"/>
   </p:notesMasterIdLst>
   <p:sldIdLst>
     <p:sldId id="256" r:id="rId2"/>
     <p:sldId id="257" r:id="rId3"/>
     <p:sldId id="259" r:id="rId4"/>
-    <p:sldId id="260" r:id="rId5"/>
+    <p:sldId id="261" r:id="rId5"/>
+    <p:sldId id="260" r:id="rId6"/>
   </p:sldIdLst>
   <p:sldSz cx="9144000" cy="6858000" type="screen4x3"/>
   <p:notesSz cx="6858000" cy="9144000"/>
@@ -717,6 +718,95 @@
             <a:fld id="{ACA256E8-5C37-4652-B0E1-C5A6E91068A6}" type="slidenum">
               <a:rPr lang="de-DE" smtClean="0"/>
               <a:t>4</a:t>
+            </a:fld>
+            <a:endParaRPr lang="de-DE"/>
+          </a:p>
+        </p:txBody>
+      </p:sp>
+    </p:spTree>
+    <p:extLst>
+      <p:ext uri="{BB962C8B-B14F-4D97-AF65-F5344CB8AC3E}">
+        <p14:creationId xmlns:p14="http://schemas.microsoft.com/office/powerpoint/2010/main" val="3644406549"/>
+      </p:ext>
+    </p:extLst>
+  </p:cSld>
+  <p:clrMapOvr>
+    <a:masterClrMapping/>
+  </p:clrMapOvr>
+</p:notes>
+</file>
+
+<file path=ppt/notesSlides/notesSlide4.xml><?xml version="1.0" encoding="utf-8"?>
+<p:notes xmlns:a="http://schemas.openxmlformats.org/drawingml/2006/main" xmlns:r="http://schemas.openxmlformats.org/officeDocument/2006/relationships" xmlns:p="http://schemas.openxmlformats.org/presentationml/2006/main">
+  <p:cSld>
+    <p:spTree>
+      <p:nvGrpSpPr>
+        <p:cNvPr id="1" name=""/>
+        <p:cNvGrpSpPr/>
+        <p:nvPr/>
+      </p:nvGrpSpPr>
+      <p:grpSpPr>
+        <a:xfrm>
+          <a:off x="0" y="0"/>
+          <a:ext cx="0" cy="0"/>
+          <a:chOff x="0" y="0"/>
+          <a:chExt cx="0" cy="0"/>
+        </a:xfrm>
+      </p:grpSpPr>
+      <p:sp>
+        <p:nvSpPr>
+          <p:cNvPr id="2" name="Slide Image Placeholder 1"/>
+          <p:cNvSpPr>
+            <a:spLocks noGrp="1" noRot="1" noChangeAspect="1"/>
+          </p:cNvSpPr>
+          <p:nvPr>
+            <p:ph type="sldImg"/>
+          </p:nvPr>
+        </p:nvSpPr>
+        <p:spPr>
+          <a:xfrm>
+            <a:off x="1371600" y="1143000"/>
+            <a:ext cx="4114800" cy="3086100"/>
+          </a:xfrm>
+        </p:spPr>
+      </p:sp>
+      <p:sp>
+        <p:nvSpPr>
+          <p:cNvPr id="3" name="Notes Placeholder 2"/>
+          <p:cNvSpPr>
+            <a:spLocks noGrp="1"/>
+          </p:cNvSpPr>
+          <p:nvPr>
+            <p:ph type="body" idx="1"/>
+          </p:nvPr>
+        </p:nvSpPr>
+        <p:spPr/>
+        <p:txBody>
+          <a:bodyPr/>
+          <a:lstStyle/>
+          <a:p>
+            <a:endParaRPr lang="de-DE"/>
+          </a:p>
+        </p:txBody>
+      </p:sp>
+      <p:sp>
+        <p:nvSpPr>
+          <p:cNvPr id="4" name="Slide Number Placeholder 3"/>
+          <p:cNvSpPr>
+            <a:spLocks noGrp="1"/>
+          </p:cNvSpPr>
+          <p:nvPr>
+            <p:ph type="sldNum" sz="quarter" idx="10"/>
+          </p:nvPr>
+        </p:nvSpPr>
+        <p:spPr/>
+        <p:txBody>
+          <a:bodyPr/>
+          <a:lstStyle/>
+          <a:p>
+            <a:fld id="{ACA256E8-5C37-4652-B0E1-C5A6E91068A6}" type="slidenum">
+              <a:rPr lang="de-DE" smtClean="0"/>
+              <a:t>5</a:t>
             </a:fld>
             <a:endParaRPr lang="de-DE"/>
           </a:p>
@@ -3976,11 +4066,7 @@
             </a:r>
             <a:r>
               <a:rPr lang="de-DE" sz="3000" b="1" dirty="0" smtClean="0"/>
-              <a:t> </a:t>
-            </a:r>
-            <a:r>
-              <a:rPr lang="de-DE" sz="3000" b="1" dirty="0" smtClean="0"/>
-              <a:t>Content</a:t>
+              <a:t> Content</a:t>
             </a:r>
             <a:endParaRPr lang="de-DE" sz="3000" b="1" dirty="0"/>
           </a:p>
@@ -4030,11 +4116,7 @@
             </a:pPr>
             <a:r>
               <a:rPr lang="en-GB" sz="2400" dirty="0" smtClean="0"/>
-              <a:t>Project </a:t>
-            </a:r>
-            <a:r>
-              <a:rPr lang="en-GB" sz="2400" dirty="0" smtClean="0"/>
-              <a:t>Management</a:t>
+              <a:t>Project Management</a:t>
             </a:r>
           </a:p>
           <a:p>
@@ -4086,11 +4168,7 @@
             </a:pPr>
             <a:r>
               <a:rPr lang="en-GB" sz="2400" dirty="0" smtClean="0"/>
-              <a:t>Flight </a:t>
-            </a:r>
-            <a:r>
-              <a:rPr lang="en-GB" sz="2400" dirty="0" smtClean="0"/>
-              <a:t>Controller</a:t>
+              <a:t>Flight Controller</a:t>
             </a:r>
           </a:p>
           <a:p>
@@ -4118,7 +4196,6 @@
               <a:rPr lang="en-GB" sz="2400" dirty="0" smtClean="0"/>
               <a:t>Conclusion</a:t>
             </a:r>
-            <a:endParaRPr lang="en-GB" sz="2400" dirty="0" smtClean="0"/>
           </a:p>
           <a:p>
             <a:pPr marL="342900" indent="-342900">
@@ -4130,11 +4207,7 @@
             </a:pPr>
             <a:r>
               <a:rPr lang="en-GB" sz="2400" dirty="0" smtClean="0"/>
-              <a:t>Lessons </a:t>
-            </a:r>
-            <a:r>
-              <a:rPr lang="en-GB" sz="2400" dirty="0" smtClean="0"/>
-              <a:t>Learned</a:t>
+              <a:t>Lessons Learned</a:t>
             </a:r>
             <a:endParaRPr lang="en-GB" sz="2400" dirty="0"/>
           </a:p>
@@ -4324,11 +4397,7 @@
             </a:r>
             <a:r>
               <a:rPr lang="de-DE" sz="2000" dirty="0" smtClean="0"/>
-              <a:t> Project: </a:t>
-            </a:r>
-            <a:r>
-              <a:rPr lang="de-DE" sz="2000" dirty="0" smtClean="0"/>
-              <a:t>Table </a:t>
+              <a:t> Project: Table </a:t>
             </a:r>
             <a:r>
               <a:rPr lang="de-DE" sz="2000" dirty="0" err="1" smtClean="0"/>
@@ -4509,8 +4578,8 @@
         </p:nvSpPr>
         <p:spPr>
           <a:xfrm>
-            <a:off x="574957" y="2239909"/>
-            <a:ext cx="3091110" cy="1354217"/>
+            <a:off x="329426" y="1816218"/>
+            <a:ext cx="4386427" cy="3954929"/>
           </a:xfrm>
           <a:prstGeom prst="rect">
             <a:avLst/>
@@ -4529,10 +4598,33 @@
               </a:spcAft>
             </a:pPr>
             <a:r>
+              <a:rPr lang="en-GB" sz="2400" dirty="0" smtClean="0"/>
+              <a:t>The X-Copter will be an autonomous modular </a:t>
+            </a:r>
+            <a:r>
               <a:rPr lang="en-GB" sz="2400" dirty="0" err="1" smtClean="0"/>
-              <a:t>TEXTtextTEXT</a:t>
+              <a:t>multicopter</a:t>
             </a:r>
             <a:endParaRPr lang="en-GB" sz="2400" dirty="0" smtClean="0"/>
+          </a:p>
+          <a:p>
+            <a:pPr>
+              <a:spcAft>
+                <a:spcPts val="600"/>
+              </a:spcAft>
+            </a:pPr>
+            <a:endParaRPr lang="en-GB" sz="2400" dirty="0"/>
+          </a:p>
+          <a:p>
+            <a:pPr>
+              <a:spcAft>
+                <a:spcPts val="600"/>
+              </a:spcAft>
+            </a:pPr>
+            <a:r>
+              <a:rPr lang="en-GB" sz="2400" dirty="0" smtClean="0"/>
+              <a:t>Fields of application</a:t>
+            </a:r>
           </a:p>
           <a:p>
             <a:pPr marL="342900" indent="-342900">
@@ -4543,10 +4635,9 @@
               <a:buChar char="§"/>
             </a:pPr>
             <a:r>
-              <a:rPr lang="en-GB" sz="2400" dirty="0" err="1" smtClean="0"/>
-              <a:t>Gjfh</a:t>
-            </a:r>
-            <a:endParaRPr lang="en-GB" sz="2400" dirty="0" smtClean="0"/>
+              <a:rPr lang="en-GB" sz="2400" dirty="0" smtClean="0"/>
+              <a:t>3D Mapping</a:t>
+            </a:r>
           </a:p>
           <a:p>
             <a:pPr marL="342900" indent="-342900">
@@ -4557,10 +4648,53 @@
               <a:buChar char="§"/>
             </a:pPr>
             <a:r>
-              <a:rPr lang="en-GB" sz="2400" dirty="0" err="1" smtClean="0"/>
-              <a:t>ghgn</a:t>
-            </a:r>
-            <a:endParaRPr lang="en-GB" sz="2400" dirty="0"/>
+              <a:rPr lang="en-GB" sz="2400" dirty="0" smtClean="0"/>
+              <a:t>Rescue Missions</a:t>
+            </a:r>
+          </a:p>
+          <a:p>
+            <a:pPr marL="342900" indent="-342900">
+              <a:spcAft>
+                <a:spcPts val="600"/>
+              </a:spcAft>
+              <a:buFont typeface="Wingdings" panose="05000000000000000000" pitchFamily="2" charset="2"/>
+              <a:buChar char="§"/>
+            </a:pPr>
+            <a:r>
+              <a:rPr lang="en-GB" sz="2400" dirty="0" smtClean="0"/>
+              <a:t>Surveillance</a:t>
+            </a:r>
+          </a:p>
+          <a:p>
+            <a:pPr marL="342900" indent="-342900">
+              <a:spcAft>
+                <a:spcPts val="600"/>
+              </a:spcAft>
+              <a:buFont typeface="Wingdings" panose="05000000000000000000" pitchFamily="2" charset="2"/>
+              <a:buChar char="§"/>
+            </a:pPr>
+            <a:r>
+              <a:rPr lang="en-GB" sz="2400" dirty="0" smtClean="0"/>
+              <a:t>Parcel delivery</a:t>
+            </a:r>
+            <a:r>
+              <a:rPr lang="en-GB" sz="2400" dirty="0" smtClean="0"/>
+              <a:t> </a:t>
+            </a:r>
+          </a:p>
+          <a:p>
+            <a:pPr marL="342900" indent="-342900">
+              <a:spcAft>
+                <a:spcPts val="600"/>
+              </a:spcAft>
+              <a:buFont typeface="Wingdings" panose="05000000000000000000" pitchFamily="2" charset="2"/>
+              <a:buChar char="§"/>
+            </a:pPr>
+            <a:r>
+              <a:rPr lang="en-GB" sz="2400" dirty="0" smtClean="0"/>
+              <a:t>Movie Production</a:t>
+            </a:r>
+            <a:endParaRPr lang="en-GB" sz="2400" dirty="0" smtClean="0"/>
           </a:p>
         </p:txBody>
       </p:sp>
@@ -4839,6 +4973,252 @@
           </a:p>
         </p:txBody>
       </p:sp>
+      <p:pic>
+        <p:nvPicPr>
+          <p:cNvPr id="3" name="Picture 2"/>
+          <p:cNvPicPr>
+            <a:picLocks noChangeAspect="1"/>
+          </p:cNvPicPr>
+          <p:nvPr/>
+        </p:nvPicPr>
+        <p:blipFill>
+          <a:blip r:embed="rId4">
+            <a:extLst>
+              <a:ext uri="{28A0092B-C50C-407E-A947-70E740481C1C}">
+                <a14:useLocalDpi xmlns:a14="http://schemas.microsoft.com/office/drawing/2010/main" val="0"/>
+              </a:ext>
+            </a:extLst>
+          </a:blip>
+          <a:stretch>
+            <a:fillRect/>
+          </a:stretch>
+        </p:blipFill>
+        <p:spPr>
+          <a:xfrm>
+            <a:off x="5053103" y="2107316"/>
+            <a:ext cx="2448363" cy="2509572"/>
+          </a:xfrm>
+          <a:prstGeom prst="rect">
+            <a:avLst/>
+          </a:prstGeom>
+        </p:spPr>
+      </p:pic>
+      <p:pic>
+        <p:nvPicPr>
+          <p:cNvPr id="16" name="Picture 15"/>
+          <p:cNvPicPr>
+            <a:picLocks noChangeAspect="1"/>
+          </p:cNvPicPr>
+          <p:nvPr/>
+        </p:nvPicPr>
+        <p:blipFill>
+          <a:blip r:embed="rId5" cstate="print">
+            <a:extLst>
+              <a:ext uri="{28A0092B-C50C-407E-A947-70E740481C1C}">
+                <a14:useLocalDpi xmlns:a14="http://schemas.microsoft.com/office/drawing/2010/main" val="0"/>
+              </a:ext>
+            </a:extLst>
+          </a:blip>
+          <a:stretch>
+            <a:fillRect/>
+          </a:stretch>
+        </p:blipFill>
+        <p:spPr>
+          <a:xfrm>
+            <a:off x="5865481" y="1169492"/>
+            <a:ext cx="1846907" cy="1721230"/>
+          </a:xfrm>
+          <a:prstGeom prst="ellipse">
+            <a:avLst/>
+          </a:prstGeom>
+          <a:ln w="12700" cap="rnd">
+            <a:solidFill>
+              <a:srgbClr val="333333"/>
+            </a:solidFill>
+          </a:ln>
+          <a:effectLst>
+            <a:outerShdw blurRad="381000" dist="292100" dir="5400000" sx="-80000" sy="-18000" rotWithShape="0">
+              <a:srgbClr val="000000">
+                <a:alpha val="22000"/>
+              </a:srgbClr>
+            </a:outerShdw>
+          </a:effectLst>
+          <a:scene3d>
+            <a:camera prst="orthographicFront"/>
+            <a:lightRig rig="contrasting" dir="t">
+              <a:rot lat="0" lon="0" rev="3000000"/>
+            </a:lightRig>
+          </a:scene3d>
+          <a:sp3d contourW="7620">
+            <a:bevelT w="95250" h="31750"/>
+            <a:contourClr>
+              <a:srgbClr val="333333"/>
+            </a:contourClr>
+          </a:sp3d>
+        </p:spPr>
+      </p:pic>
+      <p:pic>
+        <p:nvPicPr>
+          <p:cNvPr id="18" name="Picture 17"/>
+          <p:cNvPicPr>
+            <a:picLocks noChangeAspect="1"/>
+          </p:cNvPicPr>
+          <p:nvPr/>
+        </p:nvPicPr>
+        <p:blipFill>
+          <a:blip r:embed="rId5" cstate="print">
+            <a:extLst>
+              <a:ext uri="{28A0092B-C50C-407E-A947-70E740481C1C}">
+                <a14:useLocalDpi xmlns:a14="http://schemas.microsoft.com/office/drawing/2010/main" val="0"/>
+              </a:ext>
+            </a:extLst>
+          </a:blip>
+          <a:stretch>
+            <a:fillRect/>
+          </a:stretch>
+        </p:blipFill>
+        <p:spPr>
+          <a:xfrm>
+            <a:off x="4084848" y="2611079"/>
+            <a:ext cx="1846907" cy="1721230"/>
+          </a:xfrm>
+          <a:prstGeom prst="ellipse">
+            <a:avLst/>
+          </a:prstGeom>
+          <a:ln w="12700" cap="rnd">
+            <a:solidFill>
+              <a:srgbClr val="333333"/>
+            </a:solidFill>
+          </a:ln>
+          <a:effectLst>
+            <a:outerShdw blurRad="381000" dist="292100" dir="5400000" sx="-80000" sy="-18000" rotWithShape="0">
+              <a:srgbClr val="000000">
+                <a:alpha val="22000"/>
+              </a:srgbClr>
+            </a:outerShdw>
+          </a:effectLst>
+          <a:scene3d>
+            <a:camera prst="orthographicFront"/>
+            <a:lightRig rig="contrasting" dir="t">
+              <a:rot lat="0" lon="0" rev="3000000"/>
+            </a:lightRig>
+          </a:scene3d>
+          <a:sp3d contourW="7620">
+            <a:bevelT w="95250" h="31750"/>
+            <a:contourClr>
+              <a:srgbClr val="333333"/>
+            </a:contourClr>
+          </a:sp3d>
+        </p:spPr>
+      </p:pic>
+      <p:pic>
+        <p:nvPicPr>
+          <p:cNvPr id="19" name="Picture 18"/>
+          <p:cNvPicPr>
+            <a:picLocks noChangeAspect="1"/>
+          </p:cNvPicPr>
+          <p:nvPr/>
+        </p:nvPicPr>
+        <p:blipFill>
+          <a:blip r:embed="rId5" cstate="print">
+            <a:extLst>
+              <a:ext uri="{28A0092B-C50C-407E-A947-70E740481C1C}">
+                <a14:useLocalDpi xmlns:a14="http://schemas.microsoft.com/office/drawing/2010/main" val="0"/>
+              </a:ext>
+            </a:extLst>
+          </a:blip>
+          <a:stretch>
+            <a:fillRect/>
+          </a:stretch>
+        </p:blipFill>
+        <p:spPr>
+          <a:xfrm>
+            <a:off x="7207716" y="2647215"/>
+            <a:ext cx="1846907" cy="1721230"/>
+          </a:xfrm>
+          <a:prstGeom prst="ellipse">
+            <a:avLst/>
+          </a:prstGeom>
+          <a:ln w="12700" cap="rnd">
+            <a:solidFill>
+              <a:srgbClr val="333333"/>
+            </a:solidFill>
+          </a:ln>
+          <a:effectLst>
+            <a:outerShdw blurRad="381000" dist="292100" dir="5400000" sx="-80000" sy="-18000" rotWithShape="0">
+              <a:srgbClr val="000000">
+                <a:alpha val="22000"/>
+              </a:srgbClr>
+            </a:outerShdw>
+          </a:effectLst>
+          <a:scene3d>
+            <a:camera prst="orthographicFront"/>
+            <a:lightRig rig="contrasting" dir="t">
+              <a:rot lat="0" lon="0" rev="3000000"/>
+            </a:lightRig>
+          </a:scene3d>
+          <a:sp3d contourW="7620">
+            <a:bevelT w="95250" h="31750"/>
+            <a:contourClr>
+              <a:srgbClr val="333333"/>
+            </a:contourClr>
+          </a:sp3d>
+        </p:spPr>
+      </p:pic>
+      <p:pic>
+        <p:nvPicPr>
+          <p:cNvPr id="20" name="Picture 19"/>
+          <p:cNvPicPr>
+            <a:picLocks noChangeAspect="1"/>
+          </p:cNvPicPr>
+          <p:nvPr/>
+        </p:nvPicPr>
+        <p:blipFill>
+          <a:blip r:embed="rId5" cstate="print">
+            <a:extLst>
+              <a:ext uri="{28A0092B-C50C-407E-A947-70E740481C1C}">
+                <a14:useLocalDpi xmlns:a14="http://schemas.microsoft.com/office/drawing/2010/main" val="0"/>
+              </a:ext>
+            </a:extLst>
+          </a:blip>
+          <a:stretch>
+            <a:fillRect/>
+          </a:stretch>
+        </p:blipFill>
+        <p:spPr>
+          <a:xfrm>
+            <a:off x="5405610" y="4047729"/>
+            <a:ext cx="1846907" cy="1721230"/>
+          </a:xfrm>
+          <a:prstGeom prst="ellipse">
+            <a:avLst/>
+          </a:prstGeom>
+          <a:ln w="12700" cap="rnd">
+            <a:solidFill>
+              <a:srgbClr val="333333"/>
+            </a:solidFill>
+          </a:ln>
+          <a:effectLst>
+            <a:outerShdw blurRad="381000" dist="292100" dir="5400000" sx="-80000" sy="-18000" rotWithShape="0">
+              <a:srgbClr val="000000">
+                <a:alpha val="22000"/>
+              </a:srgbClr>
+            </a:outerShdw>
+          </a:effectLst>
+          <a:scene3d>
+            <a:camera prst="orthographicFront"/>
+            <a:lightRig rig="contrasting" dir="t">
+              <a:rot lat="0" lon="0" rev="3000000"/>
+            </a:lightRig>
+          </a:scene3d>
+          <a:sp3d contourW="7620">
+            <a:bevelT w="95250" h="31750"/>
+            <a:contourClr>
+              <a:srgbClr val="333333"/>
+            </a:contourClr>
+          </a:sp3d>
+        </p:spPr>
+      </p:pic>
     </p:spTree>
     <p:extLst>
       <p:ext uri="{BB962C8B-B14F-4D97-AF65-F5344CB8AC3E}">
@@ -4885,7 +5265,7 @@
         <p:spPr>
           <a:xfrm>
             <a:off x="329426" y="1210949"/>
-            <a:ext cx="4224041" cy="553998"/>
+            <a:ext cx="2811924" cy="553998"/>
           </a:xfrm>
           <a:prstGeom prst="rect">
             <a:avLst/>
@@ -4900,7 +5280,7 @@
           <a:p>
             <a:r>
               <a:rPr lang="en-GB" sz="3000" b="1" dirty="0" smtClean="0"/>
-              <a:t>Initial state of the Project</a:t>
+              <a:t>Customer Needs</a:t>
             </a:r>
             <a:endParaRPr lang="en-GB" sz="3000" b="1" dirty="0"/>
           </a:p>
@@ -4915,7 +5295,7 @@
         <p:spPr>
           <a:xfrm>
             <a:off x="574957" y="2239909"/>
-            <a:ext cx="3091110" cy="461665"/>
+            <a:ext cx="3091110" cy="3908762"/>
           </a:xfrm>
           <a:prstGeom prst="rect">
             <a:avLst/>
@@ -4934,10 +5314,115 @@
               </a:spcAft>
             </a:pPr>
             <a:r>
-              <a:rPr lang="en-GB" sz="2400" dirty="0" err="1" smtClean="0"/>
-              <a:t>TEXTtextTEXT</a:t>
-            </a:r>
-            <a:endParaRPr lang="en-GB" sz="2400" dirty="0"/>
+              <a:rPr lang="en-GB" sz="2400" b="1" dirty="0" smtClean="0"/>
+              <a:t>Basic Requirements</a:t>
+            </a:r>
+            <a:endParaRPr lang="en-GB" sz="2400" b="1" dirty="0" smtClean="0"/>
+          </a:p>
+          <a:p>
+            <a:pPr marL="342900" indent="-342900">
+              <a:spcAft>
+                <a:spcPts val="600"/>
+              </a:spcAft>
+              <a:buFont typeface="Wingdings" panose="05000000000000000000" pitchFamily="2" charset="2"/>
+              <a:buChar char="§"/>
+            </a:pPr>
+            <a:r>
+              <a:rPr lang="en-GB" sz="2000" dirty="0" smtClean="0"/>
+              <a:t>Modularity (4/6 rotors)</a:t>
+            </a:r>
+            <a:endParaRPr lang="en-GB" sz="2000" dirty="0" smtClean="0"/>
+          </a:p>
+          <a:p>
+            <a:pPr marL="342900" indent="-342900">
+              <a:spcAft>
+                <a:spcPts val="600"/>
+              </a:spcAft>
+              <a:buFont typeface="Wingdings" panose="05000000000000000000" pitchFamily="2" charset="2"/>
+              <a:buChar char="§"/>
+            </a:pPr>
+            <a:r>
+              <a:rPr lang="en-GB" sz="2000" dirty="0" smtClean="0"/>
+              <a:t>Stable power supply</a:t>
+            </a:r>
+          </a:p>
+          <a:p>
+            <a:pPr marL="342900" indent="-342900">
+              <a:spcAft>
+                <a:spcPts val="600"/>
+              </a:spcAft>
+              <a:buFont typeface="Wingdings" panose="05000000000000000000" pitchFamily="2" charset="2"/>
+              <a:buChar char="§"/>
+            </a:pPr>
+            <a:r>
+              <a:rPr lang="en-GB" sz="2000" dirty="0" smtClean="0"/>
+              <a:t>Sturdy construction</a:t>
+            </a:r>
+          </a:p>
+          <a:p>
+            <a:pPr marL="342900" indent="-342900">
+              <a:spcAft>
+                <a:spcPts val="600"/>
+              </a:spcAft>
+              <a:buFont typeface="Wingdings" panose="05000000000000000000" pitchFamily="2" charset="2"/>
+              <a:buChar char="§"/>
+            </a:pPr>
+            <a:r>
+              <a:rPr lang="en-GB" sz="2000" dirty="0" smtClean="0"/>
+              <a:t>Remote control</a:t>
+            </a:r>
+          </a:p>
+          <a:p>
+            <a:pPr marL="342900" indent="-342900">
+              <a:spcAft>
+                <a:spcPts val="600"/>
+              </a:spcAft>
+              <a:buFont typeface="Wingdings" panose="05000000000000000000" pitchFamily="2" charset="2"/>
+              <a:buChar char="§"/>
+            </a:pPr>
+            <a:r>
+              <a:rPr lang="en-GB" sz="2000" dirty="0" smtClean="0"/>
+              <a:t>Test flight</a:t>
+            </a:r>
+            <a:endParaRPr lang="en-GB" sz="2000" dirty="0"/>
+          </a:p>
+          <a:p>
+            <a:pPr>
+              <a:spcAft>
+                <a:spcPts val="600"/>
+              </a:spcAft>
+            </a:pPr>
+            <a:r>
+              <a:rPr lang="en-GB" sz="2400" b="1" dirty="0" smtClean="0"/>
+              <a:t>Flight Controller</a:t>
+            </a:r>
+          </a:p>
+          <a:p>
+            <a:pPr marL="342900" indent="-342900">
+              <a:spcAft>
+                <a:spcPts val="600"/>
+              </a:spcAft>
+              <a:buFont typeface="Wingdings" panose="05000000000000000000" pitchFamily="2" charset="2"/>
+              <a:buChar char="§"/>
+            </a:pPr>
+            <a:r>
+              <a:rPr lang="en-GB" sz="2000" dirty="0" smtClean="0"/>
+              <a:t>Test with commercial Flight Controller</a:t>
+            </a:r>
+          </a:p>
+          <a:p>
+            <a:pPr marL="342900" indent="-342900">
+              <a:spcAft>
+                <a:spcPts val="600"/>
+              </a:spcAft>
+              <a:buFont typeface="Wingdings" panose="05000000000000000000" pitchFamily="2" charset="2"/>
+              <a:buChar char="§"/>
+            </a:pPr>
+            <a:r>
+              <a:rPr lang="en-GB" sz="2000" dirty="0" smtClean="0"/>
+              <a:t>Own Flight Controller</a:t>
+            </a:r>
+            <a:endParaRPr lang="en-GB" sz="2000" dirty="0"/>
           </a:p>
         </p:txBody>
       </p:sp>
@@ -4971,6 +5456,582 @@
               </a:rPr>
               <a:pPr algn="ctr"/>
               <a:t>4</a:t>
+            </a:fld>
+            <a:endParaRPr lang="de-DE" b="1" dirty="0">
+              <a:solidFill>
+                <a:schemeClr val="accent5"/>
+              </a:solidFill>
+            </a:endParaRPr>
+          </a:p>
+        </p:txBody>
+      </p:sp>
+      <p:pic>
+        <p:nvPicPr>
+          <p:cNvPr id="9" name="Picture 8"/>
+          <p:cNvPicPr>
+            <a:picLocks noChangeAspect="1"/>
+          </p:cNvPicPr>
+          <p:nvPr/>
+        </p:nvPicPr>
+        <p:blipFill>
+          <a:blip r:embed="rId3" cstate="print">
+            <a:extLst>
+              <a:ext uri="{28A0092B-C50C-407E-A947-70E740481C1C}">
+                <a14:useLocalDpi xmlns:a14="http://schemas.microsoft.com/office/drawing/2010/main" val="0"/>
+              </a:ext>
+            </a:extLst>
+          </a:blip>
+          <a:stretch>
+            <a:fillRect/>
+          </a:stretch>
+        </p:blipFill>
+        <p:spPr>
+          <a:xfrm>
+            <a:off x="7800967" y="0"/>
+            <a:ext cx="1232964" cy="838415"/>
+          </a:xfrm>
+          <a:prstGeom prst="rect">
+            <a:avLst/>
+          </a:prstGeom>
+        </p:spPr>
+      </p:pic>
+      <p:sp>
+        <p:nvSpPr>
+          <p:cNvPr id="10" name="TextBox 9"/>
+          <p:cNvSpPr txBox="1"/>
+          <p:nvPr/>
+        </p:nvSpPr>
+        <p:spPr>
+          <a:xfrm>
+            <a:off x="7804107" y="838415"/>
+            <a:ext cx="1229824" cy="461665"/>
+          </a:xfrm>
+          <a:prstGeom prst="rect">
+            <a:avLst/>
+          </a:prstGeom>
+          <a:noFill/>
+        </p:spPr>
+        <p:txBody>
+          <a:bodyPr wrap="none" rtlCol="0">
+            <a:spAutoFit/>
+          </a:bodyPr>
+          <a:lstStyle/>
+          <a:p>
+            <a:pPr algn="ctr"/>
+            <a:r>
+              <a:rPr lang="en-US" sz="1200" dirty="0" smtClean="0"/>
+              <a:t>University of</a:t>
+            </a:r>
+          </a:p>
+          <a:p>
+            <a:pPr algn="ctr"/>
+            <a:r>
+              <a:rPr lang="en-US" sz="1200" dirty="0" smtClean="0"/>
+              <a:t>Applied Sciences</a:t>
+            </a:r>
+            <a:endParaRPr lang="en-US" sz="1200" dirty="0"/>
+          </a:p>
+        </p:txBody>
+      </p:sp>
+      <p:sp>
+        <p:nvSpPr>
+          <p:cNvPr id="11" name="Rectangle 10"/>
+          <p:cNvSpPr/>
+          <p:nvPr/>
+        </p:nvSpPr>
+        <p:spPr>
+          <a:xfrm>
+            <a:off x="-1" y="728141"/>
+            <a:ext cx="7501467" cy="144959"/>
+          </a:xfrm>
+          <a:prstGeom prst="rect">
+            <a:avLst/>
+          </a:prstGeom>
+          <a:solidFill>
+            <a:schemeClr val="accent1"/>
+          </a:solidFill>
+          <a:ln>
+            <a:noFill/>
+          </a:ln>
+        </p:spPr>
+        <p:style>
+          <a:lnRef idx="2">
+            <a:schemeClr val="accent1">
+              <a:shade val="50000"/>
+            </a:schemeClr>
+          </a:lnRef>
+          <a:fillRef idx="1">
+            <a:schemeClr val="accent1"/>
+          </a:fillRef>
+          <a:effectRef idx="0">
+            <a:schemeClr val="accent1"/>
+          </a:effectRef>
+          <a:fontRef idx="minor">
+            <a:schemeClr val="lt1"/>
+          </a:fontRef>
+        </p:style>
+        <p:txBody>
+          <a:bodyPr rtlCol="0" anchor="ctr"/>
+          <a:lstStyle/>
+          <a:p>
+            <a:pPr algn="ctr"/>
+            <a:endParaRPr lang="de-DE"/>
+          </a:p>
+        </p:txBody>
+      </p:sp>
+      <p:sp>
+        <p:nvSpPr>
+          <p:cNvPr id="12" name="TextBox 11"/>
+          <p:cNvSpPr txBox="1"/>
+          <p:nvPr/>
+        </p:nvSpPr>
+        <p:spPr>
+          <a:xfrm>
+            <a:off x="329426" y="190237"/>
+            <a:ext cx="3458191" cy="400110"/>
+          </a:xfrm>
+          <a:prstGeom prst="rect">
+            <a:avLst/>
+          </a:prstGeom>
+          <a:noFill/>
+        </p:spPr>
+        <p:txBody>
+          <a:bodyPr wrap="none" rtlCol="0">
+            <a:spAutoFit/>
+          </a:bodyPr>
+          <a:lstStyle/>
+          <a:p>
+            <a:r>
+              <a:rPr lang="en-GB" sz="2000" dirty="0" smtClean="0"/>
+              <a:t>The X-Copter Project: Overview</a:t>
+            </a:r>
+            <a:endParaRPr lang="en-GB" sz="2000" dirty="0"/>
+          </a:p>
+        </p:txBody>
+      </p:sp>
+      <p:sp>
+        <p:nvSpPr>
+          <p:cNvPr id="14" name="Rectangle 13"/>
+          <p:cNvSpPr/>
+          <p:nvPr/>
+        </p:nvSpPr>
+        <p:spPr>
+          <a:xfrm>
+            <a:off x="0" y="6493933"/>
+            <a:ext cx="4479501" cy="76200"/>
+          </a:xfrm>
+          <a:prstGeom prst="rect">
+            <a:avLst/>
+          </a:prstGeom>
+          <a:solidFill>
+            <a:schemeClr val="accent1"/>
+          </a:solidFill>
+          <a:ln>
+            <a:noFill/>
+          </a:ln>
+        </p:spPr>
+        <p:style>
+          <a:lnRef idx="2">
+            <a:schemeClr val="accent1">
+              <a:shade val="50000"/>
+            </a:schemeClr>
+          </a:lnRef>
+          <a:fillRef idx="1">
+            <a:schemeClr val="accent1"/>
+          </a:fillRef>
+          <a:effectRef idx="0">
+            <a:schemeClr val="accent1"/>
+          </a:effectRef>
+          <a:fontRef idx="minor">
+            <a:schemeClr val="lt1"/>
+          </a:fontRef>
+        </p:style>
+        <p:txBody>
+          <a:bodyPr rtlCol="0" anchor="ctr"/>
+          <a:lstStyle/>
+          <a:p>
+            <a:pPr algn="ctr"/>
+            <a:endParaRPr lang="de-DE"/>
+          </a:p>
+        </p:txBody>
+      </p:sp>
+      <p:sp>
+        <p:nvSpPr>
+          <p:cNvPr id="15" name="Rectangle 14"/>
+          <p:cNvSpPr/>
+          <p:nvPr/>
+        </p:nvSpPr>
+        <p:spPr>
+          <a:xfrm>
+            <a:off x="4859443" y="6493933"/>
+            <a:ext cx="4287092" cy="76200"/>
+          </a:xfrm>
+          <a:prstGeom prst="rect">
+            <a:avLst/>
+          </a:prstGeom>
+          <a:solidFill>
+            <a:schemeClr val="accent1"/>
+          </a:solidFill>
+          <a:ln>
+            <a:noFill/>
+          </a:ln>
+        </p:spPr>
+        <p:style>
+          <a:lnRef idx="2">
+            <a:schemeClr val="accent1">
+              <a:shade val="50000"/>
+            </a:schemeClr>
+          </a:lnRef>
+          <a:fillRef idx="1">
+            <a:schemeClr val="accent1"/>
+          </a:fillRef>
+          <a:effectRef idx="0">
+            <a:schemeClr val="accent1"/>
+          </a:effectRef>
+          <a:fontRef idx="minor">
+            <a:schemeClr val="lt1"/>
+          </a:fontRef>
+        </p:style>
+        <p:txBody>
+          <a:bodyPr rtlCol="0" anchor="ctr"/>
+          <a:lstStyle/>
+          <a:p>
+            <a:pPr algn="ctr"/>
+            <a:endParaRPr lang="de-DE"/>
+          </a:p>
+        </p:txBody>
+      </p:sp>
+      <p:sp>
+        <p:nvSpPr>
+          <p:cNvPr id="13" name="TextBox 12"/>
+          <p:cNvSpPr txBox="1"/>
+          <p:nvPr/>
+        </p:nvSpPr>
+        <p:spPr>
+          <a:xfrm>
+            <a:off x="4479500" y="2239909"/>
+            <a:ext cx="4080840" cy="4493538"/>
+          </a:xfrm>
+          <a:prstGeom prst="rect">
+            <a:avLst/>
+          </a:prstGeom>
+          <a:noFill/>
+        </p:spPr>
+        <p:txBody>
+          <a:bodyPr wrap="square" rtlCol="0">
+            <a:spAutoFit/>
+          </a:bodyPr>
+          <a:lstStyle/>
+          <a:p>
+            <a:pPr>
+              <a:spcAft>
+                <a:spcPts val="600"/>
+              </a:spcAft>
+            </a:pPr>
+            <a:r>
+              <a:rPr lang="en-GB" sz="2400" b="1" dirty="0" smtClean="0"/>
+              <a:t>Logging and Sensors</a:t>
+            </a:r>
+            <a:endParaRPr lang="en-GB" sz="2400" b="1" dirty="0" smtClean="0"/>
+          </a:p>
+          <a:p>
+            <a:pPr marL="342900" indent="-342900">
+              <a:spcAft>
+                <a:spcPts val="600"/>
+              </a:spcAft>
+              <a:buFont typeface="Wingdings" panose="05000000000000000000" pitchFamily="2" charset="2"/>
+              <a:buChar char="§"/>
+            </a:pPr>
+            <a:r>
+              <a:rPr lang="en-GB" sz="2000" dirty="0" smtClean="0"/>
+              <a:t>Evaluating sensor data</a:t>
+            </a:r>
+          </a:p>
+          <a:p>
+            <a:pPr marL="342900" indent="-342900">
+              <a:spcAft>
+                <a:spcPts val="600"/>
+              </a:spcAft>
+              <a:buFont typeface="Wingdings" panose="05000000000000000000" pitchFamily="2" charset="2"/>
+              <a:buChar char="§"/>
+            </a:pPr>
+            <a:r>
+              <a:rPr lang="en-GB" sz="2000" dirty="0" smtClean="0"/>
+              <a:t>Logging of all sensor data</a:t>
+            </a:r>
+          </a:p>
+          <a:p>
+            <a:pPr marL="342900" indent="-342900">
+              <a:spcAft>
+                <a:spcPts val="600"/>
+              </a:spcAft>
+              <a:buFont typeface="Wingdings" panose="05000000000000000000" pitchFamily="2" charset="2"/>
+              <a:buChar char="§"/>
+            </a:pPr>
+            <a:r>
+              <a:rPr lang="en-GB" sz="2000" dirty="0" smtClean="0"/>
+              <a:t>Visualisation on Ground </a:t>
+            </a:r>
+            <a:r>
+              <a:rPr lang="en-GB" sz="2000" dirty="0"/>
+              <a:t>Station</a:t>
+            </a:r>
+          </a:p>
+          <a:p>
+            <a:pPr marL="342900" indent="-342900">
+              <a:spcAft>
+                <a:spcPts val="600"/>
+              </a:spcAft>
+              <a:buFont typeface="Wingdings" panose="05000000000000000000" pitchFamily="2" charset="2"/>
+              <a:buChar char="§"/>
+            </a:pPr>
+            <a:endParaRPr lang="en-GB" sz="2000" dirty="0" smtClean="0"/>
+          </a:p>
+          <a:p>
+            <a:pPr marL="342900" indent="-342900">
+              <a:spcAft>
+                <a:spcPts val="600"/>
+              </a:spcAft>
+              <a:buFont typeface="Wingdings" panose="05000000000000000000" pitchFamily="2" charset="2"/>
+              <a:buChar char="§"/>
+            </a:pPr>
+            <a:endParaRPr lang="en-GB" sz="2400" dirty="0"/>
+          </a:p>
+          <a:p>
+            <a:pPr>
+              <a:spcAft>
+                <a:spcPts val="600"/>
+              </a:spcAft>
+            </a:pPr>
+            <a:r>
+              <a:rPr lang="en-GB" sz="2400" b="1" dirty="0" smtClean="0"/>
+              <a:t>Future Development</a:t>
+            </a:r>
+          </a:p>
+          <a:p>
+            <a:pPr marL="342900" indent="-342900">
+              <a:spcAft>
+                <a:spcPts val="600"/>
+              </a:spcAft>
+              <a:buFont typeface="Wingdings" panose="05000000000000000000" pitchFamily="2" charset="2"/>
+              <a:buChar char="§"/>
+            </a:pPr>
+            <a:r>
+              <a:rPr lang="en-GB" sz="2000" dirty="0" smtClean="0"/>
+              <a:t>3D Environment Mapping</a:t>
+            </a:r>
+          </a:p>
+          <a:p>
+            <a:pPr marL="342900" indent="-342900">
+              <a:spcAft>
+                <a:spcPts val="600"/>
+              </a:spcAft>
+              <a:buFont typeface="Wingdings" panose="05000000000000000000" pitchFamily="2" charset="2"/>
+              <a:buChar char="§"/>
+            </a:pPr>
+            <a:r>
+              <a:rPr lang="en-GB" sz="2000" dirty="0" smtClean="0"/>
+              <a:t>Autonomous flight</a:t>
+            </a:r>
+          </a:p>
+          <a:p>
+            <a:pPr marL="342900" indent="-342900">
+              <a:spcAft>
+                <a:spcPts val="600"/>
+              </a:spcAft>
+              <a:buFont typeface="Wingdings" panose="05000000000000000000" pitchFamily="2" charset="2"/>
+              <a:buChar char="§"/>
+            </a:pPr>
+            <a:r>
+              <a:rPr lang="en-GB" sz="2000" dirty="0" smtClean="0"/>
+              <a:t>Collision control</a:t>
+            </a:r>
+          </a:p>
+          <a:p>
+            <a:pPr marL="342900" indent="-342900">
+              <a:spcAft>
+                <a:spcPts val="600"/>
+              </a:spcAft>
+              <a:buFont typeface="Wingdings" panose="05000000000000000000" pitchFamily="2" charset="2"/>
+              <a:buChar char="§"/>
+            </a:pPr>
+            <a:endParaRPr lang="en-GB" sz="2400" b="1" dirty="0"/>
+          </a:p>
+        </p:txBody>
+      </p:sp>
+      <p:pic>
+        <p:nvPicPr>
+          <p:cNvPr id="1026" name="Picture 2" descr="http://oism.co.uk/wp-content/uploads/2012/01/landing-client-feedback.jpg"/>
+          <p:cNvPicPr>
+            <a:picLocks noChangeAspect="1" noChangeArrowheads="1"/>
+          </p:cNvPicPr>
+          <p:nvPr/>
+        </p:nvPicPr>
+        <p:blipFill>
+          <a:blip r:embed="rId4" cstate="print">
+            <a:extLst>
+              <a:ext uri="{28A0092B-C50C-407E-A947-70E740481C1C}">
+                <a14:useLocalDpi xmlns:a14="http://schemas.microsoft.com/office/drawing/2010/main" val="0"/>
+              </a:ext>
+            </a:extLst>
+          </a:blip>
+          <a:srcRect/>
+          <a:stretch>
+            <a:fillRect/>
+          </a:stretch>
+        </p:blipFill>
+        <p:spPr bwMode="auto">
+          <a:xfrm>
+            <a:off x="3322872" y="1069248"/>
+            <a:ext cx="3286759" cy="1026199"/>
+          </a:xfrm>
+          <a:prstGeom prst="rect">
+            <a:avLst/>
+          </a:prstGeom>
+          <a:noFill/>
+          <a:extLst>
+            <a:ext uri="{909E8E84-426E-40DD-AFC4-6F175D3DCCD1}">
+              <a14:hiddenFill xmlns:a14="http://schemas.microsoft.com/office/drawing/2010/main">
+                <a:solidFill>
+                  <a:srgbClr val="FFFFFF"/>
+                </a:solidFill>
+              </a14:hiddenFill>
+            </a:ext>
+          </a:extLst>
+        </p:spPr>
+      </p:pic>
+    </p:spTree>
+    <p:extLst>
+      <p:ext uri="{BB962C8B-B14F-4D97-AF65-F5344CB8AC3E}">
+        <p14:creationId xmlns:p14="http://schemas.microsoft.com/office/powerpoint/2010/main" val="18888950"/>
+      </p:ext>
+    </p:extLst>
+  </p:cSld>
+  <p:clrMapOvr>
+    <a:masterClrMapping/>
+  </p:clrMapOvr>
+  <p:timing>
+    <p:tnLst>
+      <p:par>
+        <p:cTn id="1" dur="indefinite" restart="never" nodeType="tmRoot"/>
+      </p:par>
+    </p:tnLst>
+  </p:timing>
+</p:sld>
+</file>
+
+<file path=ppt/slides/slide5.xml><?xml version="1.0" encoding="utf-8"?>
+<p:sld xmlns:a="http://schemas.openxmlformats.org/drawingml/2006/main" xmlns:r="http://schemas.openxmlformats.org/officeDocument/2006/relationships" xmlns:p="http://schemas.openxmlformats.org/presentationml/2006/main">
+  <p:cSld>
+    <p:spTree>
+      <p:nvGrpSpPr>
+        <p:cNvPr id="1" name=""/>
+        <p:cNvGrpSpPr/>
+        <p:nvPr/>
+      </p:nvGrpSpPr>
+      <p:grpSpPr>
+        <a:xfrm>
+          <a:off x="0" y="0"/>
+          <a:ext cx="0" cy="0"/>
+          <a:chOff x="0" y="0"/>
+          <a:chExt cx="0" cy="0"/>
+        </a:xfrm>
+      </p:grpSpPr>
+      <p:sp>
+        <p:nvSpPr>
+          <p:cNvPr id="5" name="TextBox 4"/>
+          <p:cNvSpPr txBox="1"/>
+          <p:nvPr/>
+        </p:nvSpPr>
+        <p:spPr>
+          <a:xfrm>
+            <a:off x="329426" y="1210949"/>
+            <a:ext cx="4224041" cy="553998"/>
+          </a:xfrm>
+          <a:prstGeom prst="rect">
+            <a:avLst/>
+          </a:prstGeom>
+          <a:noFill/>
+        </p:spPr>
+        <p:txBody>
+          <a:bodyPr wrap="none" rtlCol="0">
+            <a:spAutoFit/>
+          </a:bodyPr>
+          <a:lstStyle/>
+          <a:p>
+            <a:r>
+              <a:rPr lang="en-GB" sz="3000" b="1" dirty="0" smtClean="0"/>
+              <a:t>Initial state of the Project</a:t>
+            </a:r>
+            <a:endParaRPr lang="en-GB" sz="3000" b="1" dirty="0"/>
+          </a:p>
+        </p:txBody>
+      </p:sp>
+      <p:sp>
+        <p:nvSpPr>
+          <p:cNvPr id="7" name="TextBox 6"/>
+          <p:cNvSpPr txBox="1"/>
+          <p:nvPr/>
+        </p:nvSpPr>
+        <p:spPr>
+          <a:xfrm>
+            <a:off x="574957" y="2239909"/>
+            <a:ext cx="3091110" cy="461665"/>
+          </a:xfrm>
+          <a:prstGeom prst="rect">
+            <a:avLst/>
+          </a:prstGeom>
+          <a:noFill/>
+        </p:spPr>
+        <p:txBody>
+          <a:bodyPr wrap="square" rtlCol="0">
+            <a:spAutoFit/>
+          </a:bodyPr>
+          <a:lstStyle/>
+          <a:p>
+            <a:pPr>
+              <a:spcAft>
+                <a:spcPts val="600"/>
+              </a:spcAft>
+            </a:pPr>
+            <a:r>
+              <a:rPr lang="en-GB" sz="2400" dirty="0" err="1" smtClean="0"/>
+              <a:t>TEXTtextTEXT</a:t>
+            </a:r>
+            <a:endParaRPr lang="en-GB" sz="2400" dirty="0"/>
+          </a:p>
+        </p:txBody>
+      </p:sp>
+      <p:sp>
+        <p:nvSpPr>
+          <p:cNvPr id="8" name="Slide Number Placeholder 7"/>
+          <p:cNvSpPr>
+            <a:spLocks noGrp="1"/>
+          </p:cNvSpPr>
+          <p:nvPr>
+            <p:ph type="sldNum" sz="quarter" idx="12"/>
+          </p:nvPr>
+        </p:nvSpPr>
+        <p:spPr>
+          <a:xfrm>
+            <a:off x="4479500" y="6349470"/>
+            <a:ext cx="363641" cy="365125"/>
+          </a:xfrm>
+          <a:noFill/>
+        </p:spPr>
+        <p:txBody>
+          <a:bodyPr/>
+          <a:lstStyle/>
+          <a:p>
+            <a:pPr algn="ctr"/>
+            <a:fld id="{E2CFAF74-B2E6-4153-882D-B5265360E8DB}" type="slidenum">
+              <a:rPr lang="de-DE" sz="1350" b="1" smtClean="0">
+                <a:solidFill>
+                  <a:schemeClr val="accent5"/>
+                </a:solidFill>
+              </a:rPr>
+              <a:pPr algn="ctr"/>
+              <a:t>5</a:t>
             </a:fld>
             <a:endParaRPr lang="de-DE" b="1" dirty="0">
               <a:solidFill>

</xml_diff>

<commit_message>
SLIDES V.1.00000000000000000 FINAL STABLE LONG TERM SUPPORT
</commit_message>
<xml_diff>
--- a/Final_Report/InFinalReportEinpflegen (Fuer Jan)/presentation_sample/ToC_Introduction_Customer_Needs_State_Bumblebee.pptx
+++ b/Final_Report/InFinalReportEinpflegen (Fuer Jan)/presentation_sample/ToC_Introduction_Customer_Needs_State_Bumblebee.pptx
@@ -4675,11 +4675,7 @@
             </a:pPr>
             <a:r>
               <a:rPr lang="en-GB" sz="2400" dirty="0" smtClean="0"/>
-              <a:t>Parcel delivery</a:t>
-            </a:r>
-            <a:r>
-              <a:rPr lang="en-GB" sz="2400" dirty="0" smtClean="0"/>
-              <a:t> </a:t>
+              <a:t>Parcel delivery </a:t>
             </a:r>
           </a:p>
           <a:p>
@@ -4694,7 +4690,6 @@
               <a:rPr lang="en-GB" sz="2400" dirty="0" smtClean="0"/>
               <a:t>Movie Production</a:t>
             </a:r>
-            <a:endParaRPr lang="en-GB" sz="2400" dirty="0" smtClean="0"/>
           </a:p>
         </p:txBody>
       </p:sp>
@@ -5317,7 +5312,6 @@
               <a:rPr lang="en-GB" sz="2400" b="1" dirty="0" smtClean="0"/>
               <a:t>Basic Requirements</a:t>
             </a:r>
-            <a:endParaRPr lang="en-GB" sz="2400" b="1" dirty="0" smtClean="0"/>
           </a:p>
           <a:p>
             <a:pPr marL="342900" indent="-342900">
@@ -5331,7 +5325,6 @@
               <a:rPr lang="en-GB" sz="2000" dirty="0" smtClean="0"/>
               <a:t>Modularity (4/6 rotors)</a:t>
             </a:r>
-            <a:endParaRPr lang="en-GB" sz="2000" dirty="0" smtClean="0"/>
           </a:p>
           <a:p>
             <a:pPr marL="342900" indent="-342900">
@@ -5732,7 +5725,6 @@
               <a:rPr lang="en-GB" sz="2400" b="1" dirty="0" smtClean="0"/>
               <a:t>Logging and Sensors</a:t>
             </a:r>
-            <a:endParaRPr lang="en-GB" sz="2400" b="1" dirty="0" smtClean="0"/>
           </a:p>
           <a:p>
             <a:pPr marL="342900" indent="-342900">
@@ -5937,6 +5929,36 @@
           <a:chExt cx="0" cy="0"/>
         </a:xfrm>
       </p:grpSpPr>
+      <p:pic>
+        <p:nvPicPr>
+          <p:cNvPr id="3" name="Picture 2"/>
+          <p:cNvPicPr>
+            <a:picLocks noChangeAspect="1"/>
+          </p:cNvPicPr>
+          <p:nvPr/>
+        </p:nvPicPr>
+        <p:blipFill>
+          <a:blip r:embed="rId3">
+            <a:extLst>
+              <a:ext uri="{28A0092B-C50C-407E-A947-70E740481C1C}">
+                <a14:useLocalDpi xmlns:a14="http://schemas.microsoft.com/office/drawing/2010/main" val="0"/>
+              </a:ext>
+            </a:extLst>
+          </a:blip>
+          <a:stretch>
+            <a:fillRect/>
+          </a:stretch>
+        </p:blipFill>
+        <p:spPr>
+          <a:xfrm>
+            <a:off x="4591681" y="1637929"/>
+            <a:ext cx="6195125" cy="4856004"/>
+          </a:xfrm>
+          <a:prstGeom prst="rect">
+            <a:avLst/>
+          </a:prstGeom>
+        </p:spPr>
+      </p:pic>
       <p:sp>
         <p:nvSpPr>
           <p:cNvPr id="5" name="TextBox 4"/>
@@ -5975,8 +5997,8 @@
         </p:nvSpPr>
         <p:spPr>
           <a:xfrm>
-            <a:off x="574957" y="2239909"/>
-            <a:ext cx="3091110" cy="461665"/>
+            <a:off x="574956" y="2239909"/>
+            <a:ext cx="7866915" cy="4031873"/>
           </a:xfrm>
           <a:prstGeom prst="rect">
             <a:avLst/>
@@ -5989,14 +6011,149 @@
           </a:bodyPr>
           <a:lstStyle/>
           <a:p>
-            <a:pPr>
+            <a:pPr marL="342900" indent="-342900">
               <a:spcAft>
                 <a:spcPts val="600"/>
               </a:spcAft>
+              <a:buFont typeface="Wingdings" panose="05000000000000000000" pitchFamily="2" charset="2"/>
+              <a:buChar char="§"/>
             </a:pPr>
             <a:r>
+              <a:rPr lang="en-GB" sz="2400" dirty="0" smtClean="0"/>
+              <a:t>Finished Physical model</a:t>
+            </a:r>
+          </a:p>
+          <a:p>
+            <a:pPr marL="342900" indent="-342900">
+              <a:spcAft>
+                <a:spcPts val="600"/>
+              </a:spcAft>
+              <a:buFont typeface="Wingdings" panose="05000000000000000000" pitchFamily="2" charset="2"/>
+              <a:buChar char="§"/>
+            </a:pPr>
+            <a:r>
+              <a:rPr lang="en-GB" sz="2400" dirty="0" smtClean="0"/>
+              <a:t>Custom </a:t>
+            </a:r>
+            <a:r>
+              <a:rPr lang="en-GB" sz="2400" dirty="0"/>
+              <a:t>p</a:t>
+            </a:r>
+            <a:r>
+              <a:rPr lang="en-GB" sz="2400" dirty="0" smtClean="0"/>
+              <a:t>ower supply circuit</a:t>
+            </a:r>
+          </a:p>
+          <a:p>
+            <a:pPr marL="342900" indent="-342900">
+              <a:spcAft>
+                <a:spcPts val="600"/>
+              </a:spcAft>
+              <a:buFont typeface="Wingdings" panose="05000000000000000000" pitchFamily="2" charset="2"/>
+              <a:buChar char="§"/>
+            </a:pPr>
+            <a:r>
+              <a:rPr lang="en-GB" sz="2400" dirty="0"/>
+              <a:t>Interfaces (I2C, PIOs, PWM</a:t>
+            </a:r>
+            <a:r>
+              <a:rPr lang="en-GB" sz="2400" dirty="0" smtClean="0"/>
+              <a:t>)</a:t>
+            </a:r>
+          </a:p>
+          <a:p>
+            <a:pPr marL="342900" indent="-342900">
+              <a:spcAft>
+                <a:spcPts val="600"/>
+              </a:spcAft>
+              <a:buFont typeface="Wingdings" panose="05000000000000000000" pitchFamily="2" charset="2"/>
+              <a:buChar char="§"/>
+            </a:pPr>
+            <a:r>
+              <a:rPr lang="en-GB" sz="2400" dirty="0" smtClean="0"/>
+              <a:t>Interface circuit for sensors and actors</a:t>
+            </a:r>
+          </a:p>
+          <a:p>
+            <a:pPr marL="800100" lvl="1" indent="-342900">
+              <a:spcAft>
+                <a:spcPts val="600"/>
+              </a:spcAft>
+              <a:buFont typeface="Wingdings" panose="05000000000000000000" pitchFamily="2" charset="2"/>
+              <a:buChar char="§"/>
+            </a:pPr>
+            <a:r>
+              <a:rPr lang="en-GB" sz="2400" dirty="0"/>
+              <a:t>Sensors (gyroscope, accelerometer, compass</a:t>
+            </a:r>
+            <a:r>
+              <a:rPr lang="en-GB" sz="2400" dirty="0" smtClean="0"/>
+              <a:t>)</a:t>
+            </a:r>
+            <a:endParaRPr lang="en-GB" sz="2400" dirty="0" smtClean="0"/>
+          </a:p>
+          <a:p>
+            <a:pPr marL="342900" indent="-342900">
+              <a:spcAft>
+                <a:spcPts val="600"/>
+              </a:spcAft>
+              <a:buFont typeface="Wingdings" panose="05000000000000000000" pitchFamily="2" charset="2"/>
+              <a:buChar char="§"/>
+            </a:pPr>
+            <a:r>
               <a:rPr lang="en-GB" sz="2400" dirty="0" err="1" smtClean="0"/>
-              <a:t>TEXTtextTEXT</a:t>
+              <a:t>SoPC</a:t>
+            </a:r>
+            <a:r>
+              <a:rPr lang="en-GB" sz="2400" dirty="0" smtClean="0"/>
+              <a:t> for the FPGA-part of DE1-SoC</a:t>
+            </a:r>
+          </a:p>
+          <a:p>
+            <a:pPr marL="342900" indent="-342900">
+              <a:spcAft>
+                <a:spcPts val="600"/>
+              </a:spcAft>
+              <a:buFont typeface="Wingdings" panose="05000000000000000000" pitchFamily="2" charset="2"/>
+              <a:buChar char="§"/>
+            </a:pPr>
+            <a:r>
+              <a:rPr lang="en-GB" sz="2400" dirty="0" err="1" smtClean="0"/>
+              <a:t>Interprocessor</a:t>
+            </a:r>
+            <a:r>
+              <a:rPr lang="en-GB" sz="2400" dirty="0" smtClean="0"/>
+              <a:t> communication with FIFOs</a:t>
+            </a:r>
+          </a:p>
+          <a:p>
+            <a:pPr marL="342900" indent="-342900">
+              <a:spcAft>
+                <a:spcPts val="600"/>
+              </a:spcAft>
+              <a:buFont typeface="Wingdings" panose="05000000000000000000" pitchFamily="2" charset="2"/>
+              <a:buChar char="§"/>
+            </a:pPr>
+            <a:r>
+              <a:rPr lang="en-GB" sz="2400" dirty="0" smtClean="0"/>
+              <a:t>Drivers (partially tested)</a:t>
+            </a:r>
+          </a:p>
+          <a:p>
+            <a:pPr marL="342900" indent="-342900">
+              <a:spcAft>
+                <a:spcPts val="600"/>
+              </a:spcAft>
+              <a:buFont typeface="Wingdings" panose="05000000000000000000" pitchFamily="2" charset="2"/>
+              <a:buChar char="§"/>
+            </a:pPr>
+            <a:r>
+              <a:rPr lang="en-GB" sz="2400" smtClean="0"/>
+              <a:t>(Some </a:t>
+            </a:r>
+            <a:r>
+              <a:rPr lang="en-GB" sz="2400" dirty="0" smtClean="0"/>
+              <a:t>sort of USB interface)</a:t>
             </a:r>
             <a:endParaRPr lang="en-GB" sz="2400" dirty="0"/>
           </a:p>
@@ -6050,7 +6207,7 @@
           <p:nvPr/>
         </p:nvPicPr>
         <p:blipFill>
-          <a:blip r:embed="rId3" cstate="print">
+          <a:blip r:embed="rId4" cstate="print">
             <a:extLst>
               <a:ext uri="{28A0092B-C50C-407E-A947-70E740481C1C}">
                 <a14:useLocalDpi xmlns:a14="http://schemas.microsoft.com/office/drawing/2010/main" val="0"/>

</xml_diff>